<commit_message>
Updated the presentation and plot.
</commit_message>
<xml_diff>
--- a/presentations/20230209_firebird_microburst_dispersion.pptx
+++ b/presentations/20230209_firebird_microburst_dispersion.pptx
@@ -9,11 +9,11 @@
   </p:notesMasterIdLst>
   <p:sldIdLst>
     <p:sldId id="256" r:id="rId2"/>
-    <p:sldId id="258" r:id="rId3"/>
-    <p:sldId id="262" r:id="rId4"/>
+    <p:sldId id="262" r:id="rId3"/>
+    <p:sldId id="264" r:id="rId4"/>
     <p:sldId id="260" r:id="rId5"/>
     <p:sldId id="259" r:id="rId6"/>
-    <p:sldId id="261" r:id="rId7"/>
+    <p:sldId id="263" r:id="rId7"/>
   </p:sldIdLst>
   <p:sldSz cx="12192000" cy="6858000"/>
   <p:notesSz cx="6858000" cy="9144000"/>
@@ -3914,9 +3914,16 @@
             <p:ph type="title"/>
           </p:nvPr>
         </p:nvSpPr>
-        <p:spPr/>
-        <p:txBody>
-          <a:bodyPr/>
+        <p:spPr>
+          <a:xfrm>
+            <a:off x="839788" y="457200"/>
+            <a:ext cx="3932237" cy="899967"/>
+          </a:xfrm>
+        </p:spPr>
+        <p:txBody>
+          <a:bodyPr>
+            <a:normAutofit fontScale="90000"/>
+          </a:bodyPr>
           <a:lstStyle/>
           <a:p>
             <a:r>
@@ -3944,19 +3951,44 @@
         </p:nvSpPr>
         <p:spPr>
           <a:xfrm>
-            <a:off x="839788" y="2057400"/>
-            <a:ext cx="3932237" cy="3238169"/>
+            <a:off x="839788" y="1289316"/>
+            <a:ext cx="3932237" cy="3800724"/>
           </a:xfrm>
         </p:spPr>
         <p:txBody>
           <a:bodyPr>
-            <a:normAutofit lnSpcReduction="10000"/>
+            <a:normAutofit fontScale="92500" lnSpcReduction="20000"/>
           </a:bodyPr>
           <a:lstStyle/>
           <a:p>
             <a:r>
               <a:rPr lang="en-US" dirty="0"/>
               <a:t>Hypothesized by a time-of-flight model in Miyoshi et al., (2010) and Saito et al., (2012)</a:t>
+            </a:r>
+          </a:p>
+          <a:p>
+            <a:endParaRPr lang="en-US" dirty="0"/>
+          </a:p>
+          <a:p>
+            <a:r>
+              <a:rPr lang="en-US" dirty="0"/>
+              <a:t>Called </a:t>
+            </a:r>
+            <a:r>
+              <a:rPr lang="en-US" u="sng" dirty="0"/>
+              <a:t>inverse dispersion </a:t>
+            </a:r>
+            <a:r>
+              <a:rPr lang="en-US" dirty="0"/>
+              <a:t>in Miyoshi et al., (2010) paper, and </a:t>
+            </a:r>
+            <a:r>
+              <a:rPr lang="en-US" u="sng" dirty="0"/>
+              <a:t>positive dispersion </a:t>
+            </a:r>
+            <a:r>
+              <a:rPr lang="en-US" dirty="0"/>
+              <a:t>in Saito et al., (2012)</a:t>
             </a:r>
           </a:p>
           <a:p>
@@ -4039,7 +4071,7 @@
           <a:lstStyle/>
           <a:p>
             <a:r>
-              <a:rPr lang="en-US"/>
+              <a:rPr lang="en-US" dirty="0"/>
               <a:t>Microburst Time of Flight Dispersion</a:t>
             </a:r>
           </a:p>
@@ -4076,10 +4108,10 @@
       </p:sp>
       <p:sp>
         <p:nvSpPr>
-          <p:cNvPr id="8" name="Content Placeholder 7">
-            <a:extLst>
-              <a:ext uri="{FF2B5EF4-FFF2-40B4-BE49-F238E27FC236}">
-                <a16:creationId xmlns:a16="http://schemas.microsoft.com/office/drawing/2014/main" id="{00B47AD4-8A33-EAB5-8E98-8DF1333A2E9F}"/>
+          <p:cNvPr id="30" name="Content Placeholder 29">
+            <a:extLst>
+              <a:ext uri="{FF2B5EF4-FFF2-40B4-BE49-F238E27FC236}">
+                <a16:creationId xmlns:a16="http://schemas.microsoft.com/office/drawing/2014/main" id="{8DF2F0F4-DBB6-0539-7666-EDAC598AFA84}"/>
               </a:ext>
             </a:extLst>
           </p:cNvPr>
@@ -4095,14 +4127,14 @@
           <a:bodyPr/>
           <a:lstStyle/>
           <a:p>
-            <a:endParaRPr lang="en-US"/>
+            <a:endParaRPr lang="en-US" dirty="0"/>
           </a:p>
         </p:txBody>
       </p:sp>
     </p:spTree>
     <p:extLst>
       <p:ext uri="{BB962C8B-B14F-4D97-AF65-F5344CB8AC3E}">
-        <p14:creationId xmlns:p14="http://schemas.microsoft.com/office/powerpoint/2010/main" val="4073598266"/>
+        <p14:creationId xmlns:p14="http://schemas.microsoft.com/office/powerpoint/2010/main" val="184172543"/>
       </p:ext>
     </p:extLst>
   </p:cSld>
@@ -4145,9 +4177,16 @@
             <p:ph type="title"/>
           </p:nvPr>
         </p:nvSpPr>
-        <p:spPr/>
-        <p:txBody>
-          <a:bodyPr/>
+        <p:spPr>
+          <a:xfrm>
+            <a:off x="839788" y="457200"/>
+            <a:ext cx="3932237" cy="899967"/>
+          </a:xfrm>
+        </p:spPr>
+        <p:txBody>
+          <a:bodyPr>
+            <a:normAutofit fontScale="90000"/>
+          </a:bodyPr>
           <a:lstStyle/>
           <a:p>
             <a:r>
@@ -4209,19 +4248,44 @@
         </p:nvSpPr>
         <p:spPr>
           <a:xfrm>
-            <a:off x="839788" y="2057400"/>
-            <a:ext cx="3932237" cy="3238169"/>
+            <a:off x="839788" y="1289316"/>
+            <a:ext cx="3932237" cy="3800724"/>
           </a:xfrm>
         </p:spPr>
         <p:txBody>
           <a:bodyPr>
-            <a:normAutofit lnSpcReduction="10000"/>
+            <a:normAutofit fontScale="92500" lnSpcReduction="20000"/>
           </a:bodyPr>
           <a:lstStyle/>
           <a:p>
             <a:r>
               <a:rPr lang="en-US" dirty="0"/>
               <a:t>Hypothesized by a time-of-flight model in Miyoshi et al., (2010) and Saito et al., (2012)</a:t>
+            </a:r>
+          </a:p>
+          <a:p>
+            <a:endParaRPr lang="en-US" dirty="0"/>
+          </a:p>
+          <a:p>
+            <a:r>
+              <a:rPr lang="en-US" dirty="0"/>
+              <a:t>Called </a:t>
+            </a:r>
+            <a:r>
+              <a:rPr lang="en-US" u="sng" dirty="0"/>
+              <a:t>inverse dispersion </a:t>
+            </a:r>
+            <a:r>
+              <a:rPr lang="en-US" dirty="0"/>
+              <a:t>in Miyoshi et al., (2010) paper, and </a:t>
+            </a:r>
+            <a:r>
+              <a:rPr lang="en-US" u="sng" dirty="0"/>
+              <a:t>positive dispersion </a:t>
+            </a:r>
+            <a:r>
+              <a:rPr lang="en-US" dirty="0"/>
+              <a:t>in Saito et al., (2012)</a:t>
             </a:r>
           </a:p>
           <a:p>
@@ -4363,7 +4427,7 @@
           </a:prstGeom>
           <a:ln w="76200">
             <a:solidFill>
-              <a:schemeClr val="tx1"/>
+              <a:schemeClr val="accent2"/>
             </a:solidFill>
             <a:tailEnd type="triangle"/>
           </a:ln>
@@ -4407,7 +4471,7 @@
           </a:prstGeom>
           <a:ln w="76200">
             <a:solidFill>
-              <a:schemeClr val="tx1"/>
+              <a:schemeClr val="accent2"/>
             </a:solidFill>
             <a:tailEnd type="triangle"/>
           </a:ln>
@@ -4451,7 +4515,7 @@
           </a:prstGeom>
           <a:ln w="76200">
             <a:solidFill>
-              <a:schemeClr val="tx1"/>
+              <a:schemeClr val="accent2"/>
             </a:solidFill>
             <a:tailEnd type="triangle"/>
           </a:ln>
@@ -4500,7 +4564,11 @@
           <a:lstStyle/>
           <a:p>
             <a:r>
-              <a:rPr lang="en-US" sz="1400" dirty="0"/>
+              <a:rPr lang="en-US" sz="1400" dirty="0">
+                <a:solidFill>
+                  <a:schemeClr val="accent2"/>
+                </a:solidFill>
+              </a:rPr>
               <a:t>Fit info</a:t>
             </a:r>
           </a:p>
@@ -4530,7 +4598,7 @@
           </a:prstGeom>
           <a:ln w="76200">
             <a:solidFill>
-              <a:schemeClr val="tx1"/>
+              <a:schemeClr val="accent2"/>
             </a:solidFill>
             <a:tailEnd type="triangle"/>
           </a:ln>
@@ -4579,7 +4647,11 @@
           <a:lstStyle/>
           <a:p>
             <a:r>
-              <a:rPr lang="en-US" sz="1400" dirty="0"/>
+              <a:rPr lang="en-US" sz="1400" dirty="0">
+                <a:solidFill>
+                  <a:schemeClr val="accent2"/>
+                </a:solidFill>
+              </a:rPr>
               <a:t>Gray rectangle is the fit time range and black vertical dotted line is at channel 0’s t0</a:t>
             </a:r>
           </a:p>
@@ -4609,7 +4681,7 @@
           </a:prstGeom>
           <a:ln w="76200">
             <a:solidFill>
-              <a:schemeClr val="tx1"/>
+              <a:schemeClr val="accent2"/>
             </a:solidFill>
             <a:tailEnd type="triangle"/>
           </a:ln>
@@ -4644,16 +4716,16 @@
           <p:nvPr/>
         </p:nvCxnSpPr>
         <p:spPr>
-          <a:xfrm flipH="1">
-            <a:off x="9544601" y="5567317"/>
-            <a:ext cx="609215" cy="215520"/>
+          <a:xfrm flipH="1" flipV="1">
+            <a:off x="9120146" y="5295569"/>
+            <a:ext cx="1033670" cy="271748"/>
           </a:xfrm>
           <a:prstGeom prst="straightConnector1">
             <a:avLst/>
           </a:prstGeom>
           <a:ln w="76200">
             <a:solidFill>
-              <a:schemeClr val="tx1"/>
+              <a:schemeClr val="accent2"/>
             </a:solidFill>
             <a:tailEnd type="triangle"/>
           </a:ln>
@@ -4687,8 +4759,8 @@
         </p:nvSpPr>
         <p:spPr>
           <a:xfrm>
-            <a:off x="10196829" y="4844349"/>
-            <a:ext cx="1956075" cy="1169551"/>
+            <a:off x="10090205" y="4844349"/>
+            <a:ext cx="2062699" cy="1169551"/>
           </a:xfrm>
           <a:prstGeom prst="rect">
             <a:avLst/>
@@ -4702,27 +4774,47 @@
           <a:lstStyle/>
           <a:p>
             <a:r>
-              <a:rPr lang="en-US" sz="1400" dirty="0"/>
-              <a:t>- points: microburst t0 </a:t>
-            </a:r>
-          </a:p>
-          <a:p>
-            <a:r>
-              <a:rPr lang="en-US" sz="1400" dirty="0"/>
+              <a:rPr lang="en-US" sz="1400" dirty="0">
+                <a:solidFill>
+                  <a:schemeClr val="accent2"/>
+                </a:solidFill>
+              </a:rPr>
+              <a:t>- Points are microburst t0 </a:t>
+            </a:r>
+          </a:p>
+          <a:p>
+            <a:r>
+              <a:rPr lang="en-US" sz="1400" dirty="0">
+                <a:solidFill>
+                  <a:schemeClr val="accent2"/>
+                </a:solidFill>
+              </a:rPr>
               <a:t>- X-errors are energy channel widths</a:t>
             </a:r>
           </a:p>
           <a:p>
             <a:r>
-              <a:rPr lang="en-US" sz="1400" dirty="0"/>
+              <a:rPr lang="en-US" sz="1400" dirty="0">
+                <a:solidFill>
+                  <a:schemeClr val="accent2"/>
+                </a:solidFill>
+              </a:rPr>
               <a:t>- Y-errors is the </a:t>
             </a:r>
             <a:r>
-              <a:rPr lang="en-US" sz="1400" dirty="0" err="1"/>
+              <a:rPr lang="en-US" sz="1400" dirty="0" err="1">
+                <a:solidFill>
+                  <a:schemeClr val="accent2"/>
+                </a:solidFill>
+              </a:rPr>
               <a:t>HiRes</a:t>
             </a:r>
             <a:r>
-              <a:rPr lang="en-US" sz="1400" dirty="0"/>
+              <a:rPr lang="en-US" sz="1400" dirty="0">
+                <a:solidFill>
+                  <a:schemeClr val="accent2"/>
+                </a:solidFill>
+              </a:rPr>
               <a:t> cadence</a:t>
             </a:r>
           </a:p>
@@ -4757,7 +4849,11 @@
           <a:lstStyle/>
           <a:p>
             <a:r>
-              <a:rPr lang="en-US" sz="1400" dirty="0"/>
+              <a:rPr lang="en-US" sz="1400" dirty="0">
+                <a:solidFill>
+                  <a:schemeClr val="accent2"/>
+                </a:solidFill>
+              </a:rPr>
               <a:t>Location</a:t>
             </a:r>
           </a:p>
@@ -4792,12 +4888,103 @@
           <a:lstStyle/>
           <a:p>
             <a:r>
-              <a:rPr lang="en-US" sz="1400" dirty="0" err="1"/>
+              <a:rPr lang="en-US" sz="1400" dirty="0" err="1">
+                <a:solidFill>
+                  <a:schemeClr val="accent2"/>
+                </a:solidFill>
+              </a:rPr>
               <a:t>HiRes</a:t>
             </a:r>
             <a:r>
-              <a:rPr lang="en-US" sz="1400" dirty="0"/>
+              <a:rPr lang="en-US" sz="1400" dirty="0">
+                <a:solidFill>
+                  <a:schemeClr val="accent2"/>
+                </a:solidFill>
+              </a:rPr>
               <a:t> data shown in solid and Gaussian fit shown in dashed</a:t>
+            </a:r>
+          </a:p>
+        </p:txBody>
+      </p:sp>
+      <p:cxnSp>
+        <p:nvCxnSpPr>
+          <p:cNvPr id="3" name="Straight Arrow Connector 2">
+            <a:extLst>
+              <a:ext uri="{FF2B5EF4-FFF2-40B4-BE49-F238E27FC236}">
+                <a16:creationId xmlns:a16="http://schemas.microsoft.com/office/drawing/2014/main" id="{A6E55594-5655-CA95-8269-07329B49E2B4}"/>
+              </a:ext>
+            </a:extLst>
+          </p:cNvPr>
+          <p:cNvCxnSpPr>
+            <a:cxnSpLocks/>
+          </p:cNvCxnSpPr>
+          <p:nvPr/>
+        </p:nvCxnSpPr>
+        <p:spPr>
+          <a:xfrm flipV="1">
+            <a:off x="4879134" y="5499380"/>
+            <a:ext cx="775569" cy="135874"/>
+          </a:xfrm>
+          <a:prstGeom prst="straightConnector1">
+            <a:avLst/>
+          </a:prstGeom>
+          <a:ln w="76200">
+            <a:solidFill>
+              <a:schemeClr val="accent2"/>
+            </a:solidFill>
+            <a:tailEnd type="triangle"/>
+          </a:ln>
+        </p:spPr>
+        <p:style>
+          <a:lnRef idx="1">
+            <a:schemeClr val="accent1"/>
+          </a:lnRef>
+          <a:fillRef idx="0">
+            <a:schemeClr val="accent1"/>
+          </a:fillRef>
+          <a:effectRef idx="0">
+            <a:schemeClr val="accent1"/>
+          </a:effectRef>
+          <a:fontRef idx="minor">
+            <a:schemeClr val="tx1"/>
+          </a:fontRef>
+        </p:style>
+      </p:cxnSp>
+      <p:sp>
+        <p:nvSpPr>
+          <p:cNvPr id="8" name="TextBox 7">
+            <a:extLst>
+              <a:ext uri="{FF2B5EF4-FFF2-40B4-BE49-F238E27FC236}">
+                <a16:creationId xmlns:a16="http://schemas.microsoft.com/office/drawing/2014/main" id="{91AE1A11-E904-8817-9B82-1E9D5D3A8756}"/>
+              </a:ext>
+            </a:extLst>
+          </p:cNvPr>
+          <p:cNvSpPr txBox="1"/>
+          <p:nvPr/>
+        </p:nvSpPr>
+        <p:spPr>
+          <a:xfrm>
+            <a:off x="2361537" y="5265922"/>
+            <a:ext cx="2543674" cy="738664"/>
+          </a:xfrm>
+          <a:prstGeom prst="rect">
+            <a:avLst/>
+          </a:prstGeom>
+          <a:noFill/>
+        </p:spPr>
+        <p:txBody>
+          <a:bodyPr wrap="square" rtlCol="0">
+            <a:spAutoFit/>
+          </a:bodyPr>
+          <a:lstStyle/>
+          <a:p>
+            <a:r>
+              <a:rPr lang="en-US" sz="1400" dirty="0">
+                <a:solidFill>
+                  <a:schemeClr val="accent2"/>
+                </a:solidFill>
+              </a:rPr>
+              <a:t>Positive peak time delay == positive dispersion == inverse dispersion (with respect to CH0)</a:t>
             </a:r>
           </a:p>
         </p:txBody>
@@ -4805,7 +4992,7 @@
     </p:spTree>
     <p:extLst>
       <p:ext uri="{BB962C8B-B14F-4D97-AF65-F5344CB8AC3E}">
-        <p14:creationId xmlns:p14="http://schemas.microsoft.com/office/powerpoint/2010/main" val="184172543"/>
+        <p14:creationId xmlns:p14="http://schemas.microsoft.com/office/powerpoint/2010/main" val="4099736816"/>
       </p:ext>
     </p:extLst>
   </p:cSld>
@@ -5120,9 +5307,8 @@
               </a:ext>
             </a:extLst>
           </a:blip>
-          <a:stretch>
-            <a:fillRect/>
-          </a:stretch>
+          <a:srcRect/>
+          <a:stretch/>
         </p:blipFill>
         <p:spPr>
           <a:xfrm>
@@ -5155,9 +5341,8 @@
               </a:ext>
             </a:extLst>
           </a:blip>
-          <a:stretch>
-            <a:fillRect/>
-          </a:stretch>
+          <a:srcRect/>
+          <a:stretch/>
         </p:blipFill>
         <p:spPr>
           <a:xfrm>
@@ -5306,9 +5491,8 @@
               </a:ext>
             </a:extLst>
           </a:blip>
-          <a:stretch>
-            <a:fillRect/>
-          </a:stretch>
+          <a:srcRect/>
+          <a:stretch/>
         </p:blipFill>
         <p:spPr>
           <a:xfrm>
@@ -5341,9 +5525,8 @@
               </a:ext>
             </a:extLst>
           </a:blip>
-          <a:stretch>
-            <a:fillRect/>
-          </a:stretch>
+          <a:srcRect/>
+          <a:stretch/>
         </p:blipFill>
         <p:spPr>
           <a:xfrm>
@@ -5377,7 +5560,7 @@
               <a:rPr lang="en-US" smtClean="0"/>
               <a:t>2/9/2023</a:t>
             </a:fld>
-            <a:endParaRPr lang="en-US" dirty="0"/>
+            <a:endParaRPr lang="en-US"/>
           </a:p>
         </p:txBody>
       </p:sp>
@@ -5403,7 +5586,7 @@
           <a:lstStyle/>
           <a:p>
             <a:r>
-              <a:rPr lang="en-US" dirty="0"/>
+              <a:rPr lang="en-US"/>
               <a:t>Microburst Time of Flight Dispersion</a:t>
             </a:r>
           </a:p>
@@ -5443,7 +5626,7 @@
           <p:cNvPr id="2" name="Straight Arrow Connector 1">
             <a:extLst>
               <a:ext uri="{FF2B5EF4-FFF2-40B4-BE49-F238E27FC236}">
-                <a16:creationId xmlns:a16="http://schemas.microsoft.com/office/drawing/2014/main" id="{4A7C8BFD-AE78-A55C-F10E-F92D662C8844}"/>
+                <a16:creationId xmlns:a16="http://schemas.microsoft.com/office/drawing/2014/main" id="{8408A912-783C-1562-97B4-23CB5878DBEC}"/>
               </a:ext>
             </a:extLst>
           </p:cNvPr>
@@ -5454,8 +5637,8 @@
         </p:nvCxnSpPr>
         <p:spPr>
           <a:xfrm flipH="1">
-            <a:off x="4027660" y="859500"/>
-            <a:ext cx="622194" cy="0"/>
+            <a:off x="3872285" y="4556857"/>
+            <a:ext cx="721910" cy="78753"/>
           </a:xfrm>
           <a:prstGeom prst="straightConnector1">
             <a:avLst/>
@@ -5487,7 +5670,7 @@
           <p:cNvPr id="3" name="TextBox 2">
             <a:extLst>
               <a:ext uri="{FF2B5EF4-FFF2-40B4-BE49-F238E27FC236}">
-                <a16:creationId xmlns:a16="http://schemas.microsoft.com/office/drawing/2014/main" id="{F1FCB759-59AE-1157-CBE5-17E0AC0D514D}"/>
+                <a16:creationId xmlns:a16="http://schemas.microsoft.com/office/drawing/2014/main" id="{4F883AA8-03E7-C5AB-D2F6-4901060D584C}"/>
               </a:ext>
             </a:extLst>
           </p:cNvPr>
@@ -5496,7 +5679,7 @@
         </p:nvSpPr>
         <p:spPr>
           <a:xfrm>
-            <a:off x="4649854" y="300364"/>
+            <a:off x="4482876" y="3950012"/>
             <a:ext cx="2933033" cy="1015663"/>
           </a:xfrm>
           <a:prstGeom prst="rect">
@@ -5525,7 +5708,7 @@
           <p:cNvPr id="4" name="Straight Arrow Connector 3">
             <a:extLst>
               <a:ext uri="{FF2B5EF4-FFF2-40B4-BE49-F238E27FC236}">
-                <a16:creationId xmlns:a16="http://schemas.microsoft.com/office/drawing/2014/main" id="{C75BBD98-2EA8-0AB8-88AB-0D97763684E9}"/>
+                <a16:creationId xmlns:a16="http://schemas.microsoft.com/office/drawing/2014/main" id="{CE6EA92E-5579-CAF4-866B-95D67DD1228D}"/>
               </a:ext>
             </a:extLst>
           </p:cNvPr>
@@ -5535,9 +5718,9 @@
           <p:nvPr/>
         </p:nvCxnSpPr>
         <p:spPr>
-          <a:xfrm>
-            <a:off x="6345802" y="5774732"/>
-            <a:ext cx="728867" cy="0"/>
+          <a:xfrm flipH="1">
+            <a:off x="9295075" y="5095035"/>
+            <a:ext cx="129535" cy="505679"/>
           </a:xfrm>
           <a:prstGeom prst="straightConnector1">
             <a:avLst/>
@@ -5569,7 +5752,7 @@
           <p:cNvPr id="8" name="TextBox 7">
             <a:extLst>
               <a:ext uri="{FF2B5EF4-FFF2-40B4-BE49-F238E27FC236}">
-                <a16:creationId xmlns:a16="http://schemas.microsoft.com/office/drawing/2014/main" id="{96D04505-F164-1D24-A12F-C8BE1274B7BC}"/>
+                <a16:creationId xmlns:a16="http://schemas.microsoft.com/office/drawing/2014/main" id="{F6983748-0ADF-A9C4-A035-0D38E4E9EC79}"/>
               </a:ext>
             </a:extLst>
           </p:cNvPr>
@@ -5578,7 +5761,7 @@
         </p:nvSpPr>
         <p:spPr>
           <a:xfrm>
-            <a:off x="3412769" y="5420789"/>
+            <a:off x="8153400" y="4394775"/>
             <a:ext cx="2933033" cy="707886"/>
           </a:xfrm>
           <a:prstGeom prst="rect">
@@ -5602,10 +5785,53 @@
           </a:p>
         </p:txBody>
       </p:sp>
+      <p:cxnSp>
+        <p:nvCxnSpPr>
+          <p:cNvPr id="13" name="Straight Connector 12">
+            <a:extLst>
+              <a:ext uri="{FF2B5EF4-FFF2-40B4-BE49-F238E27FC236}">
+                <a16:creationId xmlns:a16="http://schemas.microsoft.com/office/drawing/2014/main" id="{59E44269-E206-F529-4468-7D36995F9EC9}"/>
+              </a:ext>
+            </a:extLst>
+          </p:cNvPr>
+          <p:cNvCxnSpPr>
+            <a:cxnSpLocks/>
+          </p:cNvCxnSpPr>
+          <p:nvPr/>
+        </p:nvCxnSpPr>
+        <p:spPr>
+          <a:xfrm flipH="1">
+            <a:off x="3852074" y="500932"/>
+            <a:ext cx="20211" cy="4464743"/>
+          </a:xfrm>
+          <a:prstGeom prst="line">
+            <a:avLst/>
+          </a:prstGeom>
+          <a:ln w="38100">
+            <a:solidFill>
+              <a:schemeClr val="accent6"/>
+            </a:solidFill>
+          </a:ln>
+        </p:spPr>
+        <p:style>
+          <a:lnRef idx="1">
+            <a:schemeClr val="accent1"/>
+          </a:lnRef>
+          <a:fillRef idx="0">
+            <a:schemeClr val="accent1"/>
+          </a:fillRef>
+          <a:effectRef idx="0">
+            <a:schemeClr val="accent1"/>
+          </a:effectRef>
+          <a:fontRef idx="minor">
+            <a:schemeClr val="tx1"/>
+          </a:fontRef>
+        </p:style>
+      </p:cxnSp>
     </p:spTree>
     <p:extLst>
       <p:ext uri="{BB962C8B-B14F-4D97-AF65-F5344CB8AC3E}">
-        <p14:creationId xmlns:p14="http://schemas.microsoft.com/office/powerpoint/2010/main" val="3420139638"/>
+        <p14:creationId xmlns:p14="http://schemas.microsoft.com/office/powerpoint/2010/main" val="3672874755"/>
       </p:ext>
     </p:extLst>
   </p:cSld>

</xml_diff>